<commit_message>
Aggiunta la presentazione del progetto
</commit_message>
<xml_diff>
--- a/project_presentation/Presentazione progetto basi di dati 2 - Coronavirus Regione Campania - Gianmarco Beato, Alfonso Golino.pptx
+++ b/project_presentation/Presentazione progetto basi di dati 2 - Coronavirus Regione Campania - Gianmarco Beato, Alfonso Golino.pptx
@@ -696,7 +696,7 @@
           <a:effectLst/>
           <a:extLst>
             <a:ext uri="{91240B29-F687-4f45-9708-019B960494DF}">
-              <a14:hiddenLine xmlns="" xmlns:a14="http://schemas.microsoft.com/office/drawing/2010/main" w="9525">
+              <a14:hiddenLine xmlns:a14="http://schemas.microsoft.com/office/drawing/2010/main" xmlns="" w="9525">
                 <a:solidFill>
                   <a:srgbClr val="000000"/>
                 </a:solidFill>
@@ -2218,7 +2218,7 @@
           <a:ln/>
           <a:extLst>
             <a:ext uri="{91240B29-F687-4f45-9708-019B960494DF}">
-              <a14:hiddenLine xmlns="" xmlns:a14="http://schemas.microsoft.com/office/drawing/2010/main" w="9525">
+              <a14:hiddenLine xmlns:a14="http://schemas.microsoft.com/office/drawing/2010/main" xmlns="" w="9525">
                 <a:solidFill>
                   <a:srgbClr val="000000"/>
                 </a:solidFill>
@@ -2493,7 +2493,7 @@
           <a:ln/>
           <a:extLst>
             <a:ext uri="{91240B29-F687-4f45-9708-019B960494DF}">
-              <a14:hiddenLine xmlns="" xmlns:a14="http://schemas.microsoft.com/office/drawing/2010/main" w="9525">
+              <a14:hiddenLine xmlns:a14="http://schemas.microsoft.com/office/drawing/2010/main" xmlns="" w="9525">
                 <a:solidFill>
                   <a:srgbClr val="000000"/>
                 </a:solidFill>
@@ -2776,7 +2776,7 @@
           <a:ln/>
           <a:extLst>
             <a:ext uri="{91240B29-F687-4f45-9708-019B960494DF}">
-              <a14:hiddenLine xmlns="" xmlns:a14="http://schemas.microsoft.com/office/drawing/2010/main" w="9525">
+              <a14:hiddenLine xmlns:a14="http://schemas.microsoft.com/office/drawing/2010/main" xmlns="" w="9525">
                 <a:solidFill>
                   <a:srgbClr val="000000"/>
                 </a:solidFill>
@@ -3402,7 +3402,7 @@
           <a:ln/>
           <a:extLst>
             <a:ext uri="{91240B29-F687-4f45-9708-019B960494DF}">
-              <a14:hiddenLine xmlns="" xmlns:a14="http://schemas.microsoft.com/office/drawing/2010/main" w="9525">
+              <a14:hiddenLine xmlns:a14="http://schemas.microsoft.com/office/drawing/2010/main" xmlns="" w="9525">
                 <a:solidFill>
                   <a:srgbClr val="000000"/>
                 </a:solidFill>
@@ -3741,7 +3741,7 @@
           <a:ln/>
           <a:extLst>
             <a:ext uri="{91240B29-F687-4f45-9708-019B960494DF}">
-              <a14:hiddenLine xmlns="" xmlns:a14="http://schemas.microsoft.com/office/drawing/2010/main" w="9525">
+              <a14:hiddenLine xmlns:a14="http://schemas.microsoft.com/office/drawing/2010/main" xmlns="" w="9525">
                 <a:solidFill>
                   <a:srgbClr val="000000"/>
                 </a:solidFill>
@@ -4218,7 +4218,7 @@
           <a:ln/>
           <a:extLst>
             <a:ext uri="{91240B29-F687-4f45-9708-019B960494DF}">
-              <a14:hiddenLine xmlns="" xmlns:a14="http://schemas.microsoft.com/office/drawing/2010/main" w="9525">
+              <a14:hiddenLine xmlns:a14="http://schemas.microsoft.com/office/drawing/2010/main" xmlns="" w="9525">
                 <a:solidFill>
                   <a:srgbClr val="000000"/>
                 </a:solidFill>
@@ -4647,7 +4647,7 @@
           <a:ln/>
           <a:extLst>
             <a:ext uri="{91240B29-F687-4f45-9708-019B960494DF}">
-              <a14:hiddenLine xmlns="" xmlns:a14="http://schemas.microsoft.com/office/drawing/2010/main" w="9525">
+              <a14:hiddenLine xmlns:a14="http://schemas.microsoft.com/office/drawing/2010/main" xmlns="" w="9525">
                 <a:solidFill>
                   <a:srgbClr val="000000"/>
                 </a:solidFill>
@@ -9285,8 +9285,8 @@
         </p:nvSpPr>
         <p:spPr>
           <a:xfrm>
-            <a:off x="1256749" y="4452629"/>
-            <a:ext cx="3042427" cy="1200329"/>
+            <a:off x="937967" y="4447931"/>
+            <a:ext cx="3394339" cy="1477328"/>
           </a:xfrm>
           <a:prstGeom prst="rect">
             <a:avLst/>
@@ -9314,7 +9314,17 @@
             </a:pPr>
             <a:r>
               <a:rPr lang="it-IT" dirty="0"/>
-              <a:t>Beato Gianmarco</a:t>
+              <a:t>Beato Gianmarco (95%)</a:t>
+            </a:r>
+          </a:p>
+          <a:p>
+            <a:pPr marL="285750" indent="-285750">
+              <a:buFont typeface="Arial" panose="020B0604020202020204" pitchFamily="34" charset="0"/>
+              <a:buChar char="•"/>
+            </a:pPr>
+            <a:r>
+              <a:rPr lang="it-IT" dirty="0"/>
+              <a:t>Golino Alfonso (5%)</a:t>
             </a:r>
           </a:p>
           <a:p>
@@ -9336,8 +9346,8 @@
         </p:nvSpPr>
         <p:spPr>
           <a:xfrm>
-            <a:off x="4863548" y="4472702"/>
-            <a:ext cx="3042427" cy="1200329"/>
+            <a:off x="4570318" y="4427858"/>
+            <a:ext cx="3436730" cy="1477328"/>
           </a:xfrm>
           <a:prstGeom prst="rect">
             <a:avLst/>
@@ -9365,7 +9375,17 @@
             </a:pPr>
             <a:r>
               <a:rPr lang="it-IT" dirty="0"/>
-              <a:t>Golino Alfonso</a:t>
+              <a:t>Golino Alfonso (60%)</a:t>
+            </a:r>
+          </a:p>
+          <a:p>
+            <a:pPr marL="285750" indent="-285750">
+              <a:buFont typeface="Arial" panose="020B0604020202020204" pitchFamily="34" charset="0"/>
+              <a:buChar char="•"/>
+            </a:pPr>
+            <a:r>
+              <a:rPr lang="it-IT" dirty="0"/>
+              <a:t>Beato Gianmarco (40%)</a:t>
             </a:r>
           </a:p>
           <a:p>
@@ -9416,7 +9436,7 @@
             </a:pPr>
             <a:r>
               <a:rPr lang="it-IT" dirty="0"/>
-              <a:t>Golino Alfonso (70%)</a:t>
+              <a:t>Golino Alfonso (75%)</a:t>
             </a:r>
           </a:p>
           <a:p>
@@ -9426,7 +9446,7 @@
             </a:pPr>
             <a:r>
               <a:rPr lang="it-IT" dirty="0"/>
-              <a:t>Gianmarco Beato (30%)</a:t>
+              <a:t>Gianmarco Beato (25%)</a:t>
             </a:r>
           </a:p>
           <a:p>
@@ -9448,8 +9468,8 @@
         </p:nvSpPr>
         <p:spPr>
           <a:xfrm>
-            <a:off x="1073426" y="4377635"/>
-            <a:ext cx="2964070" cy="1275323"/>
+            <a:off x="754643" y="4372937"/>
+            <a:ext cx="3299791" cy="1275323"/>
           </a:xfrm>
           <a:prstGeom prst="rect">
             <a:avLst/>
@@ -9496,8 +9516,8 @@
         </p:nvSpPr>
         <p:spPr>
           <a:xfrm>
-            <a:off x="4534452" y="4377635"/>
-            <a:ext cx="2964070" cy="1275323"/>
+            <a:off x="4343247" y="4372937"/>
+            <a:ext cx="3324716" cy="1275323"/>
           </a:xfrm>
           <a:prstGeom prst="rect">
             <a:avLst/>
@@ -9544,7 +9564,7 @@
         </p:nvSpPr>
         <p:spPr>
           <a:xfrm>
-            <a:off x="7905975" y="4372937"/>
+            <a:off x="7973455" y="4372937"/>
             <a:ext cx="3433468" cy="1275323"/>
           </a:xfrm>
           <a:prstGeom prst="rect">

</xml_diff>